<commit_message>
intro to UI frameworks and libraries
</commit_message>
<xml_diff>
--- a/intro to UI framework and libraries.pptx
+++ b/intro to UI framework and libraries.pptx
@@ -21,6 +21,9 @@
     <p:sldId id="271" r:id="rId15"/>
     <p:sldId id="272" r:id="rId16"/>
     <p:sldId id="273" r:id="rId17"/>
+    <p:sldId id="274" r:id="rId18"/>
+    <p:sldId id="275" r:id="rId19"/>
+    <p:sldId id="276" r:id="rId20"/>
   </p:sldIdLst>
   <p:sldSz cx="12192000" cy="6858000"/>
   <p:notesSz cx="6858000" cy="9144000"/>
@@ -152,6 +155,9 @@
             <p14:sldId id="271"/>
             <p14:sldId id="272"/>
             <p14:sldId id="273"/>
+            <p14:sldId id="274"/>
+            <p14:sldId id="275"/>
+            <p14:sldId id="276"/>
           </p14:sldIdLst>
         </p14:section>
       </p14:sectionLst>
@@ -310,7 +316,7 @@
           <a:p>
             <a:fld id="{0861BBB3-5873-47FB-9A67-B7AC0A5ADD08}" type="datetimeFigureOut">
               <a:rPr lang="en-US" smtClean="0"/>
-              <a:t>5/13/2024</a:t>
+              <a:t>5/14/2024</a:t>
             </a:fld>
             <a:endParaRPr lang="en-US"/>
           </a:p>
@@ -508,7 +514,7 @@
           <a:p>
             <a:fld id="{0861BBB3-5873-47FB-9A67-B7AC0A5ADD08}" type="datetimeFigureOut">
               <a:rPr lang="en-US" smtClean="0"/>
-              <a:t>5/13/2024</a:t>
+              <a:t>5/14/2024</a:t>
             </a:fld>
             <a:endParaRPr lang="en-US"/>
           </a:p>
@@ -716,7 +722,7 @@
           <a:p>
             <a:fld id="{0861BBB3-5873-47FB-9A67-B7AC0A5ADD08}" type="datetimeFigureOut">
               <a:rPr lang="en-US" smtClean="0"/>
-              <a:t>5/13/2024</a:t>
+              <a:t>5/14/2024</a:t>
             </a:fld>
             <a:endParaRPr lang="en-US"/>
           </a:p>
@@ -914,7 +920,7 @@
           <a:p>
             <a:fld id="{0861BBB3-5873-47FB-9A67-B7AC0A5ADD08}" type="datetimeFigureOut">
               <a:rPr lang="en-US" smtClean="0"/>
-              <a:t>5/13/2024</a:t>
+              <a:t>5/14/2024</a:t>
             </a:fld>
             <a:endParaRPr lang="en-US"/>
           </a:p>
@@ -1189,7 +1195,7 @@
           <a:p>
             <a:fld id="{0861BBB3-5873-47FB-9A67-B7AC0A5ADD08}" type="datetimeFigureOut">
               <a:rPr lang="en-US" smtClean="0"/>
-              <a:t>5/13/2024</a:t>
+              <a:t>5/14/2024</a:t>
             </a:fld>
             <a:endParaRPr lang="en-US"/>
           </a:p>
@@ -1454,7 +1460,7 @@
           <a:p>
             <a:fld id="{0861BBB3-5873-47FB-9A67-B7AC0A5ADD08}" type="datetimeFigureOut">
               <a:rPr lang="en-US" smtClean="0"/>
-              <a:t>5/13/2024</a:t>
+              <a:t>5/14/2024</a:t>
             </a:fld>
             <a:endParaRPr lang="en-US"/>
           </a:p>
@@ -1866,7 +1872,7 @@
           <a:p>
             <a:fld id="{0861BBB3-5873-47FB-9A67-B7AC0A5ADD08}" type="datetimeFigureOut">
               <a:rPr lang="en-US" smtClean="0"/>
-              <a:t>5/13/2024</a:t>
+              <a:t>5/14/2024</a:t>
             </a:fld>
             <a:endParaRPr lang="en-US"/>
           </a:p>
@@ -2007,7 +2013,7 @@
           <a:p>
             <a:fld id="{0861BBB3-5873-47FB-9A67-B7AC0A5ADD08}" type="datetimeFigureOut">
               <a:rPr lang="en-US" smtClean="0"/>
-              <a:t>5/13/2024</a:t>
+              <a:t>5/14/2024</a:t>
             </a:fld>
             <a:endParaRPr lang="en-US"/>
           </a:p>
@@ -2120,7 +2126,7 @@
           <a:p>
             <a:fld id="{0861BBB3-5873-47FB-9A67-B7AC0A5ADD08}" type="datetimeFigureOut">
               <a:rPr lang="en-US" smtClean="0"/>
-              <a:t>5/13/2024</a:t>
+              <a:t>5/14/2024</a:t>
             </a:fld>
             <a:endParaRPr lang="en-US"/>
           </a:p>
@@ -2431,7 +2437,7 @@
           <a:p>
             <a:fld id="{0861BBB3-5873-47FB-9A67-B7AC0A5ADD08}" type="datetimeFigureOut">
               <a:rPr lang="en-US" smtClean="0"/>
-              <a:t>5/13/2024</a:t>
+              <a:t>5/14/2024</a:t>
             </a:fld>
             <a:endParaRPr lang="en-US"/>
           </a:p>
@@ -2719,7 +2725,7 @@
           <a:p>
             <a:fld id="{0861BBB3-5873-47FB-9A67-B7AC0A5ADD08}" type="datetimeFigureOut">
               <a:rPr lang="en-US" smtClean="0"/>
-              <a:t>5/13/2024</a:t>
+              <a:t>5/14/2024</a:t>
             </a:fld>
             <a:endParaRPr lang="en-US"/>
           </a:p>
@@ -2960,7 +2966,7 @@
           <a:p>
             <a:fld id="{0861BBB3-5873-47FB-9A67-B7AC0A5ADD08}" type="datetimeFigureOut">
               <a:rPr lang="en-US" smtClean="0"/>
-              <a:t>5/13/2024</a:t>
+              <a:t>5/14/2024</a:t>
             </a:fld>
             <a:endParaRPr lang="en-US"/>
           </a:p>
@@ -4350,6 +4356,313 @@
     <p:extLst>
       <p:ext uri="{BB962C8B-B14F-4D97-AF65-F5344CB8AC3E}">
         <p14:creationId xmlns:p14="http://schemas.microsoft.com/office/powerpoint/2010/main" val="2640245442"/>
+      </p:ext>
+    </p:extLst>
+  </p:cSld>
+  <p:clrMapOvr>
+    <a:masterClrMapping/>
+  </p:clrMapOvr>
+</p:sld>
+</file>
+
+<file path=ppt/slides/slide17.xml><?xml version="1.0" encoding="utf-8"?>
+<p:sld xmlns:a="http://schemas.openxmlformats.org/drawingml/2006/main" xmlns:r="http://schemas.openxmlformats.org/officeDocument/2006/relationships" xmlns:p="http://schemas.openxmlformats.org/presentationml/2006/main">
+  <p:cSld>
+    <p:spTree>
+      <p:nvGrpSpPr>
+        <p:cNvPr id="1" name=""/>
+        <p:cNvGrpSpPr/>
+        <p:nvPr/>
+      </p:nvGrpSpPr>
+      <p:grpSpPr>
+        <a:xfrm>
+          <a:off x="0" y="0"/>
+          <a:ext cx="0" cy="0"/>
+          <a:chOff x="0" y="0"/>
+          <a:chExt cx="0" cy="0"/>
+        </a:xfrm>
+      </p:grpSpPr>
+      <p:pic>
+        <p:nvPicPr>
+          <p:cNvPr id="5" name="Picture 4" descr="A close up of a logo&#10;&#10;Description automatically generated">
+            <a:extLst>
+              <a:ext uri="{FF2B5EF4-FFF2-40B4-BE49-F238E27FC236}">
+                <a16:creationId xmlns:a16="http://schemas.microsoft.com/office/drawing/2014/main" id="{E5932B85-DB32-0EE9-0CCF-C742BCA081FA}"/>
+              </a:ext>
+            </a:extLst>
+          </p:cNvPr>
+          <p:cNvPicPr>
+            <a:picLocks noChangeAspect="1"/>
+          </p:cNvPicPr>
+          <p:nvPr/>
+        </p:nvPicPr>
+        <p:blipFill>
+          <a:blip r:embed="rId2">
+            <a:extLst>
+              <a:ext uri="{28A0092B-C50C-407E-A947-70E740481C1C}">
+                <a14:useLocalDpi xmlns:a14="http://schemas.microsoft.com/office/drawing/2010/main" val="0"/>
+              </a:ext>
+            </a:extLst>
+          </a:blip>
+          <a:stretch>
+            <a:fillRect/>
+          </a:stretch>
+        </p:blipFill>
+        <p:spPr>
+          <a:xfrm>
+            <a:off x="1756757" y="856891"/>
+            <a:ext cx="8678486" cy="5144218"/>
+          </a:xfrm>
+          <a:prstGeom prst="rect">
+            <a:avLst/>
+          </a:prstGeom>
+        </p:spPr>
+      </p:pic>
+    </p:spTree>
+    <p:extLst>
+      <p:ext uri="{BB962C8B-B14F-4D97-AF65-F5344CB8AC3E}">
+        <p14:creationId xmlns:p14="http://schemas.microsoft.com/office/powerpoint/2010/main" val="3102175166"/>
+      </p:ext>
+    </p:extLst>
+  </p:cSld>
+  <p:clrMapOvr>
+    <a:masterClrMapping/>
+  </p:clrMapOvr>
+</p:sld>
+</file>
+
+<file path=ppt/slides/slide18.xml><?xml version="1.0" encoding="utf-8"?>
+<p:sld xmlns:a="http://schemas.openxmlformats.org/drawingml/2006/main" xmlns:r="http://schemas.openxmlformats.org/officeDocument/2006/relationships" xmlns:p="http://schemas.openxmlformats.org/presentationml/2006/main">
+  <p:cSld>
+    <p:spTree>
+      <p:nvGrpSpPr>
+        <p:cNvPr id="1" name=""/>
+        <p:cNvGrpSpPr/>
+        <p:nvPr/>
+      </p:nvGrpSpPr>
+      <p:grpSpPr>
+        <a:xfrm>
+          <a:off x="0" y="0"/>
+          <a:ext cx="0" cy="0"/>
+          <a:chOff x="0" y="0"/>
+          <a:chExt cx="0" cy="0"/>
+        </a:xfrm>
+      </p:grpSpPr>
+      <p:sp>
+        <p:nvSpPr>
+          <p:cNvPr id="2" name="Title 1">
+            <a:extLst>
+              <a:ext uri="{FF2B5EF4-FFF2-40B4-BE49-F238E27FC236}">
+                <a16:creationId xmlns:a16="http://schemas.microsoft.com/office/drawing/2014/main" id="{BE07EF19-AAA1-170A-0B65-725C35779F2F}"/>
+              </a:ext>
+            </a:extLst>
+          </p:cNvPr>
+          <p:cNvSpPr>
+            <a:spLocks noGrp="1"/>
+          </p:cNvSpPr>
+          <p:nvPr>
+            <p:ph type="title"/>
+          </p:nvPr>
+        </p:nvSpPr>
+        <p:spPr/>
+        <p:txBody>
+          <a:bodyPr/>
+          <a:lstStyle/>
+          <a:p>
+            <a:endParaRPr lang="en-US"/>
+          </a:p>
+        </p:txBody>
+      </p:sp>
+      <p:pic>
+        <p:nvPicPr>
+          <p:cNvPr id="5" name="Picture 4" descr="A computer screen with text&#10;&#10;Description automatically generated">
+            <a:extLst>
+              <a:ext uri="{FF2B5EF4-FFF2-40B4-BE49-F238E27FC236}">
+                <a16:creationId xmlns:a16="http://schemas.microsoft.com/office/drawing/2014/main" id="{6FEB176C-7624-02BA-A851-2D1CD2F56D99}"/>
+              </a:ext>
+            </a:extLst>
+          </p:cNvPr>
+          <p:cNvPicPr>
+            <a:picLocks noChangeAspect="1"/>
+          </p:cNvPicPr>
+          <p:nvPr/>
+        </p:nvPicPr>
+        <p:blipFill>
+          <a:blip r:embed="rId2">
+            <a:extLst>
+              <a:ext uri="{28A0092B-C50C-407E-A947-70E740481C1C}">
+                <a14:useLocalDpi xmlns:a14="http://schemas.microsoft.com/office/drawing/2010/main" val="0"/>
+              </a:ext>
+            </a:extLst>
+          </a:blip>
+          <a:stretch>
+            <a:fillRect/>
+          </a:stretch>
+        </p:blipFill>
+        <p:spPr>
+          <a:xfrm>
+            <a:off x="1204230" y="2081024"/>
+            <a:ext cx="9783540" cy="2695951"/>
+          </a:xfrm>
+          <a:prstGeom prst="rect">
+            <a:avLst/>
+          </a:prstGeom>
+        </p:spPr>
+      </p:pic>
+      <p:pic>
+        <p:nvPicPr>
+          <p:cNvPr id="7" name="Picture 6" descr="A black background with white text&#10;&#10;Description automatically generated">
+            <a:extLst>
+              <a:ext uri="{FF2B5EF4-FFF2-40B4-BE49-F238E27FC236}">
+                <a16:creationId xmlns:a16="http://schemas.microsoft.com/office/drawing/2014/main" id="{AA58C7EC-E126-8BFC-7652-FA778238C766}"/>
+              </a:ext>
+            </a:extLst>
+          </p:cNvPr>
+          <p:cNvPicPr>
+            <a:picLocks noChangeAspect="1"/>
+          </p:cNvPicPr>
+          <p:nvPr/>
+        </p:nvPicPr>
+        <p:blipFill>
+          <a:blip r:embed="rId3">
+            <a:extLst>
+              <a:ext uri="{28A0092B-C50C-407E-A947-70E740481C1C}">
+                <a14:useLocalDpi xmlns:a14="http://schemas.microsoft.com/office/drawing/2010/main" val="0"/>
+              </a:ext>
+            </a:extLst>
+          </a:blip>
+          <a:stretch>
+            <a:fillRect/>
+          </a:stretch>
+        </p:blipFill>
+        <p:spPr>
+          <a:xfrm>
+            <a:off x="1762000" y="4997241"/>
+            <a:ext cx="8392696" cy="1495634"/>
+          </a:xfrm>
+          <a:prstGeom prst="rect">
+            <a:avLst/>
+          </a:prstGeom>
+        </p:spPr>
+      </p:pic>
+    </p:spTree>
+    <p:extLst>
+      <p:ext uri="{BB962C8B-B14F-4D97-AF65-F5344CB8AC3E}">
+        <p14:creationId xmlns:p14="http://schemas.microsoft.com/office/powerpoint/2010/main" val="3933047741"/>
+      </p:ext>
+    </p:extLst>
+  </p:cSld>
+  <p:clrMapOvr>
+    <a:masterClrMapping/>
+  </p:clrMapOvr>
+</p:sld>
+</file>
+
+<file path=ppt/slides/slide19.xml><?xml version="1.0" encoding="utf-8"?>
+<p:sld xmlns:a="http://schemas.openxmlformats.org/drawingml/2006/main" xmlns:r="http://schemas.openxmlformats.org/officeDocument/2006/relationships" xmlns:p="http://schemas.openxmlformats.org/presentationml/2006/main">
+  <p:cSld>
+    <p:spTree>
+      <p:nvGrpSpPr>
+        <p:cNvPr id="1" name=""/>
+        <p:cNvGrpSpPr/>
+        <p:nvPr/>
+      </p:nvGrpSpPr>
+      <p:grpSpPr>
+        <a:xfrm>
+          <a:off x="0" y="0"/>
+          <a:ext cx="0" cy="0"/>
+          <a:chOff x="0" y="0"/>
+          <a:chExt cx="0" cy="0"/>
+        </a:xfrm>
+      </p:grpSpPr>
+      <p:sp>
+        <p:nvSpPr>
+          <p:cNvPr id="2" name="Title 1">
+            <a:extLst>
+              <a:ext uri="{FF2B5EF4-FFF2-40B4-BE49-F238E27FC236}">
+                <a16:creationId xmlns:a16="http://schemas.microsoft.com/office/drawing/2014/main" id="{937A1E7F-99B7-40E4-0404-C846773E39E7}"/>
+              </a:ext>
+            </a:extLst>
+          </p:cNvPr>
+          <p:cNvSpPr>
+            <a:spLocks noGrp="1"/>
+          </p:cNvSpPr>
+          <p:nvPr>
+            <p:ph type="title"/>
+          </p:nvPr>
+        </p:nvSpPr>
+        <p:spPr/>
+        <p:txBody>
+          <a:bodyPr/>
+          <a:lstStyle/>
+          <a:p>
+            <a:r>
+              <a:rPr lang="en-US" b="1" i="0" dirty="0">
+                <a:solidFill>
+                  <a:srgbClr val="1F1F1F"/>
+                </a:solidFill>
+                <a:effectLst/>
+                <a:highlight>
+                  <a:srgbClr val="FFFFFF"/>
+                </a:highlight>
+              </a:rPr>
+              <a:t>Using Bootstrap documentation</a:t>
+            </a:r>
+            <a:br>
+              <a:rPr lang="en-US" b="1" i="0" dirty="0">
+                <a:solidFill>
+                  <a:srgbClr val="1F1F1F"/>
+                </a:solidFill>
+                <a:effectLst/>
+                <a:highlight>
+                  <a:srgbClr val="FFFFFF"/>
+                </a:highlight>
+              </a:rPr>
+            </a:br>
+            <a:endParaRPr lang="en-US" dirty="0"/>
+          </a:p>
+        </p:txBody>
+      </p:sp>
+      <p:sp>
+        <p:nvSpPr>
+          <p:cNvPr id="3" name="Content Placeholder 2">
+            <a:extLst>
+              <a:ext uri="{FF2B5EF4-FFF2-40B4-BE49-F238E27FC236}">
+                <a16:creationId xmlns:a16="http://schemas.microsoft.com/office/drawing/2014/main" id="{722CB2F1-00E9-756D-894C-8EA2E2DE81E1}"/>
+              </a:ext>
+            </a:extLst>
+          </p:cNvPr>
+          <p:cNvSpPr>
+            <a:spLocks noGrp="1"/>
+          </p:cNvSpPr>
+          <p:nvPr>
+            <p:ph idx="1"/>
+          </p:nvPr>
+        </p:nvSpPr>
+        <p:spPr/>
+        <p:txBody>
+          <a:bodyPr/>
+          <a:lstStyle/>
+          <a:p>
+            <a:r>
+              <a:rPr lang="en-US" b="0" i="0" u="sng" dirty="0">
+                <a:effectLst/>
+                <a:highlight>
+                  <a:srgbClr val="FFFFFF"/>
+                </a:highlight>
+                <a:latin typeface="Source Sans Pro" panose="020B0503030403020204" pitchFamily="34" charset="0"/>
+                <a:hlinkClick r:id="rId2" tooltip="Bootstrap link"/>
+              </a:rPr>
+              <a:t>https://getbootstrap.com/docs</a:t>
+            </a:r>
+            <a:endParaRPr lang="en-US" dirty="0"/>
+          </a:p>
+        </p:txBody>
+      </p:sp>
+    </p:spTree>
+    <p:extLst>
+      <p:ext uri="{BB962C8B-B14F-4D97-AF65-F5344CB8AC3E}">
+        <p14:creationId xmlns:p14="http://schemas.microsoft.com/office/powerpoint/2010/main" val="410902772"/>
       </p:ext>
     </p:extLst>
   </p:cSld>

</xml_diff>